<commit_message>
Update SuicidePrevention, LineFollower & Latency
</commit_message>
<xml_diff>
--- a/Dokumente/SprintReview-5.pptx
+++ b/Dokumente/SprintReview-5.pptx
@@ -2059,7 +2059,7 @@
             </a:pPr>
             <a:fld id="{3953DA5E-C6E2-4FA2-8BC8-7FF9A5EB6734}" type="datetimeFigureOut">
               <a:rPr lang="de-DE"/>
-              <a:t>05.06.2024</a:t>
+              <a:t>11.06.2024</a:t>
             </a:fld>
             <a:endParaRPr lang="de-DE"/>
           </a:p>
@@ -2240,7 +2240,7 @@
           <a:p>
             <a:fld id="{88DE360A-102B-474E-BEC0-79AC7566E430}" type="datetimeFigureOut">
               <a:rPr lang="en-US" smtClean="0"/>
-              <a:t>6/5/2024</a:t>
+              <a:t>6/11/2024</a:t>
             </a:fld>
             <a:endParaRPr lang="en-US"/>
           </a:p>
@@ -7043,44 +7043,6 @@
           </a:p>
         </p:txBody>
       </p:sp>
-      <p:sp>
-        <p:nvSpPr>
-          <p:cNvPr id="3" name="Text Box 2"/>
-          <p:cNvSpPr txBox="1"/>
-          <p:nvPr/>
-        </p:nvSpPr>
-        <p:spPr>
-          <a:xfrm>
-            <a:off x="611505" y="1628775"/>
-            <a:ext cx="8223250" cy="306705"/>
-          </a:xfrm>
-          <a:prstGeom prst="rect">
-            <a:avLst/>
-          </a:prstGeom>
-          <a:noFill/>
-        </p:spPr>
-        <p:txBody>
-          <a:bodyPr wrap="square" rtlCol="0">
-            <a:spAutoFit/>
-          </a:bodyPr>
-          <a:lstStyle/>
-          <a:p>
-            <a:pPr indent="0">
-              <a:buFont typeface="Arial" panose="020B0604020202020204" pitchFamily="34" charset="0"/>
-              <a:buNone/>
-            </a:pPr>
-            <a:r>
-              <a:rPr lang="de-DE" altLang="en-US" sz="1400" b="1">
-                <a:latin typeface="Calibri" panose="020F0502020204030204" charset="0"/>
-              </a:rPr>
-              <a:t>User Stories - Sprint 1.</a:t>
-            </a:r>
-            <a:endParaRPr lang="de-DE" altLang="en-US">
-              <a:latin typeface="Calibri" panose="020F0502020204030204" charset="0"/>
-            </a:endParaRPr>
-          </a:p>
-        </p:txBody>
-      </p:sp>
       <p:graphicFrame>
         <p:nvGraphicFramePr>
           <p:cNvPr id="4" name="Table 3"/>
@@ -7088,7 +7050,7 @@
           <p:nvPr>
             <p:extLst>
               <p:ext uri="{D42A27DB-BD31-4B8C-83A1-F6EECF244321}">
-                <p14:modId xmlns:p14="http://schemas.microsoft.com/office/powerpoint/2010/main" val="2611407122"/>
+                <p14:modId xmlns:p14="http://schemas.microsoft.com/office/powerpoint/2010/main" val="290693839"/>
               </p:ext>
             </p:extLst>
           </p:nvPr>
@@ -7268,11 +7230,14 @@
                         <a:buNone/>
                       </a:pPr>
                       <a:r>
-                        <a:rPr lang="de-DE" altLang="en-US" dirty="0">
+                        <a:rPr lang="de-DE" altLang="en-US">
                           <a:latin typeface="Calibri" panose="020F0502020204030204" charset="0"/>
                         </a:rPr>
-                        <a:t>Tobias Haas</a:t>
+                        <a:t>Tobias Haas &amp; Patrick Thor</a:t>
                       </a:r>
+                      <a:endParaRPr lang="de-DE" altLang="en-US" dirty="0">
+                        <a:latin typeface="Calibri" panose="020F0502020204030204" charset="0"/>
+                      </a:endParaRPr>
                     </a:p>
                   </a:txBody>
                   <a:tcPr/>
@@ -8309,14 +8274,11 @@
           <a:lstStyle/>
           <a:p>
             <a:r>
-              <a:rPr lang="de-DE" altLang="en-US" dirty="0" err="1">
+              <a:rPr lang="de-DE" altLang="en-US" dirty="0">
                 <a:latin typeface="Calibri" panose="020F0502020204030204" charset="0"/>
               </a:rPr>
-              <a:t>Sprint Demo</a:t>
-            </a:r>
-            <a:endParaRPr lang="de-DE" altLang="en-US" dirty="0">
-              <a:latin typeface="Calibri" panose="020F0502020204030204" charset="0"/>
-            </a:endParaRPr>
+              <a:t>Projektdemo</a:t>
+            </a:r>
           </a:p>
         </p:txBody>
       </p:sp>
@@ -8329,7 +8291,7 @@
         <p:spPr>
           <a:xfrm>
             <a:off x="539750" y="1484630"/>
-            <a:ext cx="7945755" cy="1815882"/>
+            <a:ext cx="7945755" cy="2246769"/>
           </a:xfrm>
           <a:prstGeom prst="rect">
             <a:avLst/>
@@ -8362,7 +8324,7 @@
               <a:rPr lang="de-DE" sz="1400" dirty="0">
                 <a:latin typeface="Calibri" panose="020F0502020204030204" charset="0"/>
               </a:rPr>
-              <a:t> Oberfläche</a:t>
+              <a:t> Frontend</a:t>
             </a:r>
           </a:p>
           <a:p>
@@ -8377,7 +8339,7 @@
               <a:rPr lang="de-DE" sz="1400" b="1" dirty="0">
                 <a:latin typeface="Calibri" panose="020F0502020204030204" charset="0"/>
               </a:rPr>
-              <a:t>Stefan Rautner:</a:t>
+              <a:t>Patrick Thor:</a:t>
             </a:r>
           </a:p>
           <a:p>
@@ -8386,29 +8348,47 @@
               <a:rPr lang="de-DE" sz="1400" dirty="0">
                 <a:latin typeface="Calibri" panose="020F0502020204030204" charset="0"/>
               </a:rPr>
-              <a:t>Neues </a:t>
-            </a:r>
+              <a:t>3D-Model</a:t>
+            </a:r>
+          </a:p>
+          <a:p>
+            <a:pPr algn="ctr"/>
+            <a:endParaRPr lang="de-DE" sz="1400" dirty="0">
+              <a:latin typeface="Calibri" panose="020F0502020204030204" charset="0"/>
+            </a:endParaRPr>
+          </a:p>
+          <a:p>
+            <a:pPr algn="ctr"/>
+            <a:r>
+              <a:rPr lang="de-DE" sz="1400" b="1" dirty="0">
+                <a:latin typeface="Calibri" panose="020F0502020204030204" charset="0"/>
+              </a:rPr>
+              <a:t>Stefan Rautner:</a:t>
+            </a:r>
+          </a:p>
+          <a:p>
+            <a:pPr algn="ctr"/>
+            <a:r>
+              <a:rPr lang="de-DE" sz="1400" dirty="0">
+                <a:latin typeface="Calibri" panose="020F0502020204030204" charset="0"/>
+              </a:rPr>
+              <a:t>MBot Skript</a:t>
+            </a:r>
+          </a:p>
+          <a:p>
+            <a:pPr algn="ctr"/>
             <a:r>
               <a:rPr lang="de-DE" sz="1400" dirty="0" err="1">
                 <a:latin typeface="Calibri" panose="020F0502020204030204" charset="0"/>
               </a:rPr>
-              <a:t>Mbot</a:t>
+              <a:t>WebApp</a:t>
             </a:r>
             <a:r>
               <a:rPr lang="de-DE" sz="1400" dirty="0">
                 <a:latin typeface="Calibri" panose="020F0502020204030204" charset="0"/>
               </a:rPr>
-              <a:t> </a:t>
-            </a:r>
-            <a:r>
-              <a:rPr lang="de-DE" sz="1400" dirty="0" err="1">
-                <a:latin typeface="Calibri" panose="020F0502020204030204" charset="0"/>
-              </a:rPr>
-              <a:t>Script</a:t>
-            </a:r>
-            <a:endParaRPr lang="de-DE" sz="1400" dirty="0">
-              <a:latin typeface="Calibri" panose="020F0502020204030204" charset="0"/>
-            </a:endParaRPr>
+              <a:t> Backend</a:t>
+            </a:r>
           </a:p>
           <a:p>
             <a:pPr algn="ctr"/>
@@ -8416,29 +8396,8 @@
               <a:rPr lang="de-DE" sz="1400" dirty="0">
                 <a:latin typeface="Calibri" panose="020F0502020204030204" charset="0"/>
               </a:rPr>
-              <a:t>Neue Verbindung zu Zwischenserver</a:t>
-            </a:r>
-          </a:p>
-          <a:p>
-            <a:pPr algn="ctr"/>
-            <a:r>
-              <a:rPr lang="de-DE" sz="1400" dirty="0">
-                <a:latin typeface="Calibri" panose="020F0502020204030204" charset="0"/>
-              </a:rPr>
-              <a:t>Dokumentation</a:t>
-            </a:r>
-          </a:p>
-          <a:p>
-            <a:pPr algn="ctr"/>
-            <a:r>
-              <a:rPr lang="de-DE" sz="1400" dirty="0" err="1">
-                <a:latin typeface="Calibri" panose="020F0502020204030204" charset="0"/>
-              </a:rPr>
-              <a:t>LineFollower</a:t>
-            </a:r>
-            <a:endParaRPr lang="de-DE" sz="1400" dirty="0">
-              <a:latin typeface="Calibri" panose="020F0502020204030204" charset="0"/>
-            </a:endParaRPr>
+              <a:t>Zwischenserver</a:t>
+            </a:r>
           </a:p>
         </p:txBody>
       </p:sp>

</xml_diff>

<commit_message>
Update to final Version (except lineFollower?)
</commit_message>
<xml_diff>
--- a/Dokumente/SprintReview-5.pptx
+++ b/Dokumente/SprintReview-5.pptx
@@ -2059,7 +2059,7 @@
             </a:pPr>
             <a:fld id="{3953DA5E-C6E2-4FA2-8BC8-7FF9A5EB6734}" type="datetimeFigureOut">
               <a:rPr lang="de-DE"/>
-              <a:t>11.06.2024</a:t>
+              <a:t>12.06.2024</a:t>
             </a:fld>
             <a:endParaRPr lang="de-DE"/>
           </a:p>
@@ -2240,7 +2240,7 @@
           <a:p>
             <a:fld id="{88DE360A-102B-474E-BEC0-79AC7566E430}" type="datetimeFigureOut">
               <a:rPr lang="en-US" smtClean="0"/>
-              <a:t>6/11/2024</a:t>
+              <a:t>6/12/2024</a:t>
             </a:fld>
             <a:endParaRPr lang="en-US"/>
           </a:p>
@@ -6800,40 +6800,13 @@
               <a:buNone/>
             </a:pPr>
             <a:r>
-              <a:rPr lang="de-DE" altLang="en-US" dirty="0" err="1">
-                <a:highlight>
-                  <a:srgbClr val="00FF00"/>
-                </a:highlight>
-                <a:latin typeface="Calibri" panose="020F0502020204030204" charset="0"/>
-              </a:rPr>
-              <a:t>Mbot</a:t>
-            </a:r>
-            <a:r>
               <a:rPr lang="de-DE" altLang="en-US" dirty="0">
                 <a:highlight>
                   <a:srgbClr val="00FF00"/>
                 </a:highlight>
                 <a:latin typeface="Calibri" panose="020F0502020204030204" charset="0"/>
               </a:rPr>
-              <a:t> </a:t>
-            </a:r>
-            <a:r>
-              <a:rPr lang="de-DE" altLang="en-US" dirty="0" err="1">
-                <a:highlight>
-                  <a:srgbClr val="00FF00"/>
-                </a:highlight>
-                <a:latin typeface="Calibri" panose="020F0502020204030204" charset="0"/>
-              </a:rPr>
-              <a:t>Script</a:t>
-            </a:r>
-            <a:r>
-              <a:rPr lang="de-DE" altLang="en-US" dirty="0">
-                <a:highlight>
-                  <a:srgbClr val="00FF00"/>
-                </a:highlight>
-                <a:latin typeface="Calibri" panose="020F0502020204030204" charset="0"/>
-              </a:rPr>
-              <a:t> ändern, sodass </a:t>
+              <a:t>MBot Skript ändern, sodass </a:t>
             </a:r>
             <a:r>
               <a:rPr lang="de-DE" altLang="en-US" dirty="0" err="1">
@@ -7050,7 +7023,7 @@
           <p:nvPr>
             <p:extLst>
               <p:ext uri="{D42A27DB-BD31-4B8C-83A1-F6EECF244321}">
-                <p14:modId xmlns:p14="http://schemas.microsoft.com/office/powerpoint/2010/main" val="290693839"/>
+                <p14:modId xmlns:p14="http://schemas.microsoft.com/office/powerpoint/2010/main" val="1274903588"/>
               </p:ext>
             </p:extLst>
           </p:nvPr>
@@ -7620,7 +7593,7 @@
                         <a:rPr lang="de-DE" altLang="en-US" dirty="0">
                           <a:latin typeface="Calibri" panose="020F0502020204030204" charset="0"/>
                         </a:rPr>
-                        <a:t>10</a:t>
+                        <a:t>20</a:t>
                       </a:r>
                     </a:p>
                   </a:txBody>
@@ -7826,7 +7799,7 @@
                         <a:rPr lang="de-DE" altLang="en-US" dirty="0">
                           <a:latin typeface="Calibri" panose="020F0502020204030204" charset="0"/>
                         </a:rPr>
-                        <a:t>20</a:t>
+                        <a:t>10</a:t>
                       </a:r>
                     </a:p>
                   </a:txBody>
@@ -8291,7 +8264,7 @@
         <p:spPr>
           <a:xfrm>
             <a:off x="539750" y="1484630"/>
-            <a:ext cx="7945755" cy="2246769"/>
+            <a:ext cx="7945755" cy="3785652"/>
           </a:xfrm>
           <a:prstGeom prst="rect">
             <a:avLst/>
@@ -8306,7 +8279,7 @@
           <a:p>
             <a:pPr algn="ctr"/>
             <a:r>
-              <a:rPr lang="de-DE" sz="1400" b="1" dirty="0">
+              <a:rPr lang="de-DE" sz="2400" b="1" dirty="0">
                 <a:latin typeface="Calibri" panose="020F0502020204030204" charset="0"/>
               </a:rPr>
               <a:t>Tobias Haas:</a:t>
@@ -8315,13 +8288,13 @@
           <a:p>
             <a:pPr algn="ctr"/>
             <a:r>
-              <a:rPr lang="de-DE" sz="1400" dirty="0" err="1">
+              <a:rPr lang="de-DE" sz="2400" dirty="0" err="1">
                 <a:latin typeface="Calibri" panose="020F0502020204030204" charset="0"/>
               </a:rPr>
               <a:t>WebApp</a:t>
             </a:r>
             <a:r>
-              <a:rPr lang="de-DE" sz="1400" dirty="0">
+              <a:rPr lang="de-DE" sz="2400" dirty="0">
                 <a:latin typeface="Calibri" panose="020F0502020204030204" charset="0"/>
               </a:rPr>
               <a:t> Frontend</a:t>
@@ -8329,14 +8302,14 @@
           </a:p>
           <a:p>
             <a:pPr algn="ctr"/>
-            <a:endParaRPr lang="de-DE" sz="1400" dirty="0">
+            <a:endParaRPr lang="de-DE" sz="2400" dirty="0">
               <a:latin typeface="Calibri" panose="020F0502020204030204" charset="0"/>
             </a:endParaRPr>
           </a:p>
           <a:p>
             <a:pPr algn="ctr"/>
             <a:r>
-              <a:rPr lang="de-DE" sz="1400" b="1" dirty="0">
+              <a:rPr lang="de-DE" sz="2400" b="1" dirty="0">
                 <a:latin typeface="Calibri" panose="020F0502020204030204" charset="0"/>
               </a:rPr>
               <a:t>Patrick Thor:</a:t>
@@ -8345,7 +8318,7 @@
           <a:p>
             <a:pPr algn="ctr"/>
             <a:r>
-              <a:rPr lang="de-DE" sz="1400" dirty="0">
+              <a:rPr lang="de-DE" sz="2400" dirty="0">
                 <a:latin typeface="Calibri" panose="020F0502020204030204" charset="0"/>
               </a:rPr>
               <a:t>3D-Model</a:t>
@@ -8353,14 +8326,14 @@
           </a:p>
           <a:p>
             <a:pPr algn="ctr"/>
-            <a:endParaRPr lang="de-DE" sz="1400" dirty="0">
+            <a:endParaRPr lang="de-DE" sz="2400" dirty="0">
               <a:latin typeface="Calibri" panose="020F0502020204030204" charset="0"/>
             </a:endParaRPr>
           </a:p>
           <a:p>
             <a:pPr algn="ctr"/>
             <a:r>
-              <a:rPr lang="de-DE" sz="1400" b="1" dirty="0">
+              <a:rPr lang="de-DE" sz="2400" b="1" dirty="0">
                 <a:latin typeface="Calibri" panose="020F0502020204030204" charset="0"/>
               </a:rPr>
               <a:t>Stefan Rautner:</a:t>
@@ -8369,7 +8342,7 @@
           <a:p>
             <a:pPr algn="ctr"/>
             <a:r>
-              <a:rPr lang="de-DE" sz="1400" dirty="0">
+              <a:rPr lang="de-DE" sz="2400" dirty="0">
                 <a:latin typeface="Calibri" panose="020F0502020204030204" charset="0"/>
               </a:rPr>
               <a:t>MBot Skript</a:t>
@@ -8378,13 +8351,13 @@
           <a:p>
             <a:pPr algn="ctr"/>
             <a:r>
-              <a:rPr lang="de-DE" sz="1400" dirty="0" err="1">
+              <a:rPr lang="de-DE" sz="2400" dirty="0" err="1">
                 <a:latin typeface="Calibri" panose="020F0502020204030204" charset="0"/>
               </a:rPr>
               <a:t>WebApp</a:t>
             </a:r>
             <a:r>
-              <a:rPr lang="de-DE" sz="1400" dirty="0">
+              <a:rPr lang="de-DE" sz="2400" dirty="0">
                 <a:latin typeface="Calibri" panose="020F0502020204030204" charset="0"/>
               </a:rPr>
               <a:t> Backend</a:t>
@@ -8393,7 +8366,7 @@
           <a:p>
             <a:pPr algn="ctr"/>
             <a:r>
-              <a:rPr lang="de-DE" sz="1400" dirty="0">
+              <a:rPr lang="de-DE" sz="2400" dirty="0">
                 <a:latin typeface="Calibri" panose="020F0502020204030204" charset="0"/>
               </a:rPr>
               <a:t>Zwischenserver</a:t>
@@ -9271,15 +9244,6 @@
 </file>
 
 <file path=customXml/item1.xml><?xml version="1.0" encoding="utf-8"?>
-<?mso-contentType ?>
-<FormTemplates xmlns="http://schemas.microsoft.com/sharepoint/v3/contenttype/forms">
-  <Display>DocumentLibraryForm</Display>
-  <Edit>DocumentLibraryForm</Edit>
-  <New>DocumentLibraryForm</New>
-</FormTemplates>
-</file>
-
-<file path=customXml/item2.xml><?xml version="1.0" encoding="utf-8"?>
 <ct:contentTypeSchema xmlns:ct="http://schemas.microsoft.com/office/2006/metadata/contentType" xmlns:ma="http://schemas.microsoft.com/office/2006/metadata/properties/metaAttributes" ct:_="" ma:_="" ma:contentTypeName="Dokument" ma:contentTypeID="0x0101001A56A123154F954888BA0DA91FFC860A" ma:contentTypeVersion="6" ma:contentTypeDescription="Ein neues Dokument erstellen." ma:contentTypeScope="" ma:versionID="ff1307b2e09c0e62c228ec6b95c7fa4a">
   <xsd:schema xmlns:xsd="http://www.w3.org/2001/XMLSchema" xmlns:xs="http://www.w3.org/2001/XMLSchema" xmlns:p="http://schemas.microsoft.com/office/2006/metadata/properties" xmlns:ns2="c8b2f909-83aa-43b7-ab4a-271920d90ab4" xmlns:ns3="b63bec69-af29-4270-86aa-339f73c85580" targetNamespace="http://schemas.microsoft.com/office/2006/metadata/properties" ma:root="true" ma:fieldsID="f08ec8f7ce92c05fcd6620fcba48b801" ns2:_="" ns3:_="">
     <xsd:import namespace="c8b2f909-83aa-43b7-ab4a-271920d90ab4"/>
@@ -9456,15 +9420,16 @@
 </ct:contentTypeSchema>
 </file>
 
-<file path=customXml/itemProps1.xml><?xml version="1.0" encoding="utf-8"?>
-<ds:datastoreItem xmlns:ds="http://schemas.openxmlformats.org/officeDocument/2006/customXml" ds:itemID="{87D72E06-1029-4F4F-A291-72DB24A2B963}">
-  <ds:schemaRefs>
-    <ds:schemaRef ds:uri="http://schemas.microsoft.com/sharepoint/v3/contenttype/forms"/>
-  </ds:schemaRefs>
-</ds:datastoreItem>
+<file path=customXml/item2.xml><?xml version="1.0" encoding="utf-8"?>
+<?mso-contentType ?>
+<FormTemplates xmlns="http://schemas.microsoft.com/sharepoint/v3/contenttype/forms">
+  <Display>DocumentLibraryForm</Display>
+  <Edit>DocumentLibraryForm</Edit>
+  <New>DocumentLibraryForm</New>
+</FormTemplates>
 </file>
 
-<file path=customXml/itemProps2.xml><?xml version="1.0" encoding="utf-8"?>
+<file path=customXml/itemProps1.xml><?xml version="1.0" encoding="utf-8"?>
 <ds:datastoreItem xmlns:ds="http://schemas.openxmlformats.org/officeDocument/2006/customXml" ds:itemID="{188C9C42-3661-485F-8165-69FBA9FB301E}">
   <ds:schemaRefs>
     <ds:schemaRef ds:uri="http://schemas.microsoft.com/office/2006/metadata/contentType"/>
@@ -9481,4 +9446,12 @@
     <ds:schemaRef ds:uri="http://schemas.microsoft.com/internal/obd"/>
   </ds:schemaRefs>
 </ds:datastoreItem>
+</file>
+
+<file path=customXml/itemProps2.xml><?xml version="1.0" encoding="utf-8"?>
+<ds:datastoreItem xmlns:ds="http://schemas.openxmlformats.org/officeDocument/2006/customXml" ds:itemID="{87D72E06-1029-4F4F-A291-72DB24A2B963}">
+  <ds:schemaRefs>
+    <ds:schemaRef ds:uri="http://schemas.microsoft.com/sharepoint/v3/contenttype/forms"/>
+  </ds:schemaRefs>
+</ds:datastoreItem>
 </file>
</xml_diff>

<commit_message>
Update Repo to finished Project (except LineFollower?)
</commit_message>
<xml_diff>
--- a/Dokumente/SprintReview-5.pptx
+++ b/Dokumente/SprintReview-5.pptx
@@ -5,10 +5,10 @@
     <p:sldMasterId id="2147483648" r:id="rId3"/>
   </p:sldMasterIdLst>
   <p:notesMasterIdLst>
-    <p:notesMasterId r:id="rId10"/>
+    <p:notesMasterId r:id="rId11"/>
   </p:notesMasterIdLst>
   <p:handoutMasterIdLst>
-    <p:handoutMasterId r:id="rId11"/>
+    <p:handoutMasterId r:id="rId12"/>
   </p:handoutMasterIdLst>
   <p:sldIdLst>
     <p:sldId id="361" r:id="rId4"/>
@@ -17,6 +17,7 @@
     <p:sldId id="570" r:id="rId7"/>
     <p:sldId id="584" r:id="rId8"/>
     <p:sldId id="583" r:id="rId9"/>
+    <p:sldId id="585" r:id="rId10"/>
   </p:sldIdLst>
   <p:sldSz cx="9144000" cy="6858000" type="screen4x3"/>
   <p:notesSz cx="7099300" cy="10234613"/>
@@ -2059,7 +2060,7 @@
             </a:pPr>
             <a:fld id="{3953DA5E-C6E2-4FA2-8BC8-7FF9A5EB6734}" type="datetimeFigureOut">
               <a:rPr lang="de-DE"/>
-              <a:t>12.06.2024</a:t>
+              <a:t>13.06.2024</a:t>
             </a:fld>
             <a:endParaRPr lang="de-DE"/>
           </a:p>
@@ -2240,7 +2241,7 @@
           <a:p>
             <a:fld id="{88DE360A-102B-474E-BEC0-79AC7566E430}" type="datetimeFigureOut">
               <a:rPr lang="en-US" smtClean="0"/>
-              <a:t>6/12/2024</a:t>
+              <a:t>6/13/2024</a:t>
             </a:fld>
             <a:endParaRPr lang="en-US"/>
           </a:p>
@@ -6871,15 +6872,12 @@
               </a:rPr>
               <a:t>LineFollower</a:t>
             </a:r>
-            <a:r>
-              <a:rPr lang="de-DE" altLang="en-US" dirty="0">
-                <a:highlight>
-                  <a:srgbClr val="00FF00"/>
-                </a:highlight>
-                <a:latin typeface="Calibri" panose="020F0502020204030204" charset="0"/>
-              </a:rPr>
-              <a:t> fertig machen</a:t>
-            </a:r>
+            <a:endParaRPr lang="de-DE" altLang="en-US" dirty="0">
+              <a:highlight>
+                <a:srgbClr val="00FF00"/>
+              </a:highlight>
+              <a:latin typeface="Calibri" panose="020F0502020204030204" charset="0"/>
+            </a:endParaRPr>
           </a:p>
           <a:p>
             <a:pPr indent="0">
@@ -7023,7 +7021,7 @@
           <p:nvPr>
             <p:extLst>
               <p:ext uri="{D42A27DB-BD31-4B8C-83A1-F6EECF244321}">
-                <p14:modId xmlns:p14="http://schemas.microsoft.com/office/powerpoint/2010/main" val="1274903588"/>
+                <p14:modId xmlns:p14="http://schemas.microsoft.com/office/powerpoint/2010/main" val="3869681591"/>
               </p:ext>
             </p:extLst>
           </p:nvPr>
@@ -7677,12 +7675,9 @@
                         </a:rPr>
                         <a:t>LineFollower</a:t>
                       </a:r>
-                      <a:r>
-                        <a:rPr lang="de-DE" altLang="en-US" dirty="0">
-                          <a:latin typeface="Calibri" panose="020F0502020204030204" charset="0"/>
-                        </a:rPr>
-                        <a:t> fertig machen</a:t>
-                      </a:r>
+                      <a:endParaRPr lang="de-DE" altLang="en-US" dirty="0">
+                        <a:latin typeface="Calibri" panose="020F0502020204030204" charset="0"/>
+                      </a:endParaRPr>
                     </a:p>
                   </a:txBody>
                   <a:tcPr/>
@@ -8426,6 +8421,216 @@
         </p:txBody>
       </p:sp>
     </p:spTree>
+  </p:cSld>
+  <p:clrMapOvr>
+    <a:masterClrMapping/>
+  </p:clrMapOvr>
+</p:sld>
+</file>
+
+<file path=ppt/slides/slide7.xml><?xml version="1.0" encoding="utf-8"?>
+<p:sld xmlns:a="http://schemas.openxmlformats.org/drawingml/2006/main" xmlns:r="http://schemas.openxmlformats.org/officeDocument/2006/relationships" xmlns:p="http://schemas.openxmlformats.org/presentationml/2006/main">
+  <p:cSld>
+    <p:spTree>
+      <p:nvGrpSpPr>
+        <p:cNvPr id="1" name=""/>
+        <p:cNvGrpSpPr/>
+        <p:nvPr/>
+      </p:nvGrpSpPr>
+      <p:grpSpPr>
+        <a:xfrm>
+          <a:off x="0" y="0"/>
+          <a:ext cx="0" cy="0"/>
+          <a:chOff x="0" y="0"/>
+          <a:chExt cx="0" cy="0"/>
+        </a:xfrm>
+      </p:grpSpPr>
+      <p:sp>
+        <p:nvSpPr>
+          <p:cNvPr id="2" name="Titel 1">
+            <a:extLst>
+              <a:ext uri="{FF2B5EF4-FFF2-40B4-BE49-F238E27FC236}">
+                <a16:creationId xmlns:a16="http://schemas.microsoft.com/office/drawing/2014/main" id="{677C9EB6-E9E8-E6CA-688C-E72910123AE5}"/>
+              </a:ext>
+            </a:extLst>
+          </p:cNvPr>
+          <p:cNvSpPr>
+            <a:spLocks noGrp="1"/>
+          </p:cNvSpPr>
+          <p:nvPr>
+            <p:ph type="title"/>
+          </p:nvPr>
+        </p:nvSpPr>
+        <p:spPr/>
+        <p:txBody>
+          <a:bodyPr/>
+          <a:lstStyle/>
+          <a:p>
+            <a:r>
+              <a:rPr lang="de-AT" dirty="0"/>
+              <a:t>Probleme</a:t>
+            </a:r>
+          </a:p>
+        </p:txBody>
+      </p:sp>
+      <p:sp>
+        <p:nvSpPr>
+          <p:cNvPr id="3" name="Inhaltsplatzhalter 2">
+            <a:extLst>
+              <a:ext uri="{FF2B5EF4-FFF2-40B4-BE49-F238E27FC236}">
+                <a16:creationId xmlns:a16="http://schemas.microsoft.com/office/drawing/2014/main" id="{C892346B-E091-E448-E102-BB0F40185F60}"/>
+              </a:ext>
+            </a:extLst>
+          </p:cNvPr>
+          <p:cNvSpPr>
+            <a:spLocks noGrp="1"/>
+          </p:cNvSpPr>
+          <p:nvPr>
+            <p:ph idx="1"/>
+          </p:nvPr>
+        </p:nvSpPr>
+        <p:spPr/>
+        <p:txBody>
+          <a:bodyPr>
+            <a:normAutofit/>
+          </a:bodyPr>
+          <a:lstStyle/>
+          <a:p>
+            <a:r>
+              <a:rPr lang="de-AT" sz="2400" dirty="0" err="1"/>
+              <a:t>Firebase</a:t>
+            </a:r>
+            <a:endParaRPr lang="de-AT" sz="2400" dirty="0"/>
+          </a:p>
+          <a:p>
+            <a:r>
+              <a:rPr lang="de-AT" sz="2400" dirty="0" err="1"/>
+              <a:t>Responsiveness</a:t>
+            </a:r>
+            <a:endParaRPr lang="de-AT" sz="2400" dirty="0"/>
+          </a:p>
+          <a:p>
+            <a:r>
+              <a:rPr lang="de-AT" sz="2400" dirty="0"/>
+              <a:t>Überschrift start.html (Startposition)</a:t>
+            </a:r>
+          </a:p>
+          <a:p>
+            <a:r>
+              <a:rPr lang="de-AT" sz="2400" dirty="0"/>
+              <a:t>Code Layout (CSS)</a:t>
+            </a:r>
+          </a:p>
+          <a:p>
+            <a:r>
+              <a:rPr lang="de-AT" sz="2400" dirty="0"/>
+              <a:t>Login &amp; Register in Start.html</a:t>
+            </a:r>
+          </a:p>
+          <a:p>
+            <a:r>
+              <a:rPr lang="de-AT" sz="2400" dirty="0"/>
+              <a:t>About-Scroll Event</a:t>
+            </a:r>
+          </a:p>
+          <a:p>
+            <a:r>
+              <a:rPr lang="de-AT" sz="2400" dirty="0"/>
+              <a:t>Dino-Game (</a:t>
+            </a:r>
+            <a:r>
+              <a:rPr lang="de-AT" sz="2400" dirty="0" err="1"/>
+              <a:t>png</a:t>
+            </a:r>
+            <a:r>
+              <a:rPr lang="de-AT" sz="2400" dirty="0"/>
+              <a:t> </a:t>
+            </a:r>
+            <a:r>
+              <a:rPr lang="de-AT" sz="2400" dirty="0">
+                <a:sym typeface="Wingdings" panose="05000000000000000000" pitchFamily="2" charset="2"/>
+              </a:rPr>
+              <a:t></a:t>
+            </a:r>
+            <a:r>
+              <a:rPr lang="de-AT" sz="2400" dirty="0"/>
+              <a:t> base64)</a:t>
+            </a:r>
+          </a:p>
+          <a:p>
+            <a:endParaRPr lang="de-AT" sz="2400" dirty="0"/>
+          </a:p>
+        </p:txBody>
+      </p:sp>
+      <p:sp>
+        <p:nvSpPr>
+          <p:cNvPr id="4" name="Fußzeilenplatzhalter 3">
+            <a:extLst>
+              <a:ext uri="{FF2B5EF4-FFF2-40B4-BE49-F238E27FC236}">
+                <a16:creationId xmlns:a16="http://schemas.microsoft.com/office/drawing/2014/main" id="{645CBD5C-E29D-5EA6-E345-5931E3D7F23E}"/>
+              </a:ext>
+            </a:extLst>
+          </p:cNvPr>
+          <p:cNvSpPr>
+            <a:spLocks noGrp="1"/>
+          </p:cNvSpPr>
+          <p:nvPr>
+            <p:ph type="ftr" sz="quarter" idx="11"/>
+          </p:nvPr>
+        </p:nvSpPr>
+        <p:spPr/>
+        <p:txBody>
+          <a:bodyPr/>
+          <a:lstStyle/>
+          <a:p>
+            <a:pPr>
+              <a:defRPr/>
+            </a:pPr>
+            <a:r>
+              <a:rPr lang="de-DE"/>
+              <a:t>DI(FH) Falkensteiner Markus</a:t>
+            </a:r>
+          </a:p>
+        </p:txBody>
+      </p:sp>
+      <p:sp>
+        <p:nvSpPr>
+          <p:cNvPr id="5" name="Foliennummernplatzhalter 4">
+            <a:extLst>
+              <a:ext uri="{FF2B5EF4-FFF2-40B4-BE49-F238E27FC236}">
+                <a16:creationId xmlns:a16="http://schemas.microsoft.com/office/drawing/2014/main" id="{EB53E1D9-4D7D-F5D4-2C7D-D5F725F59CD5}"/>
+              </a:ext>
+            </a:extLst>
+          </p:cNvPr>
+          <p:cNvSpPr>
+            <a:spLocks noGrp="1"/>
+          </p:cNvSpPr>
+          <p:nvPr>
+            <p:ph type="sldNum" sz="quarter" idx="12"/>
+          </p:nvPr>
+        </p:nvSpPr>
+        <p:spPr/>
+        <p:txBody>
+          <a:bodyPr/>
+          <a:lstStyle/>
+          <a:p>
+            <a:pPr>
+              <a:defRPr/>
+            </a:pPr>
+            <a:fld id="{AE4538FE-AEB4-413B-B741-EC1BAEEF6B8F}" type="slidenum">
+              <a:rPr lang="de-AT" smtClean="0"/>
+              <a:t>7</a:t>
+            </a:fld>
+            <a:endParaRPr lang="de-AT"/>
+          </a:p>
+        </p:txBody>
+      </p:sp>
+    </p:spTree>
+    <p:extLst>
+      <p:ext uri="{BB962C8B-B14F-4D97-AF65-F5344CB8AC3E}">
+        <p14:creationId xmlns:p14="http://schemas.microsoft.com/office/powerpoint/2010/main" val="726592610"/>
+      </p:ext>
+    </p:extLst>
   </p:cSld>
   <p:clrMapOvr>
     <a:masterClrMapping/>

</xml_diff>